<commit_message>
CHORE: add doc-folder-app-launcher for attachment
</commit_message>
<xml_diff>
--- a/DOC_APP_LAUNCHER.pptx
+++ b/DOC_APP_LAUNCHER.pptx
@@ -6506,6 +6506,283 @@
           <a:chExt cx="0" cy="0"/>
         </a:xfrm>
       </p:grpSpPr>
+      <p:grpSp>
+        <p:nvGrpSpPr>
+          <p:cNvPr id="10" name="Group 9">
+            <a:extLst>
+              <a:ext uri="{FF2B5EF4-FFF2-40B4-BE49-F238E27FC236}">
+                <a16:creationId xmlns:a16="http://schemas.microsoft.com/office/drawing/2014/main" id="{EB3C8C4B-119D-41B6-9566-12AB433A24B3}"/>
+              </a:ext>
+            </a:extLst>
+          </p:cNvPr>
+          <p:cNvGrpSpPr/>
+          <p:nvPr/>
+        </p:nvGrpSpPr>
+        <p:grpSpPr>
+          <a:xfrm>
+            <a:off x="737987" y="1649585"/>
+            <a:ext cx="4686300" cy="3558830"/>
+            <a:chOff x="1409700" y="1552578"/>
+            <a:chExt cx="4686300" cy="3558830"/>
+          </a:xfrm>
+        </p:grpSpPr>
+        <p:pic>
+          <p:nvPicPr>
+            <p:cNvPr id="4" name="Picture 3">
+              <a:extLst>
+                <a:ext uri="{FF2B5EF4-FFF2-40B4-BE49-F238E27FC236}">
+                  <a16:creationId xmlns:a16="http://schemas.microsoft.com/office/drawing/2014/main" id="{289E895F-E7B0-44B1-A256-8416B589C18B}"/>
+                </a:ext>
+              </a:extLst>
+            </p:cNvPr>
+            <p:cNvPicPr>
+              <a:picLocks noChangeAspect="1"/>
+            </p:cNvPicPr>
+            <p:nvPr/>
+          </p:nvPicPr>
+          <p:blipFill>
+            <a:blip r:embed="rId2"/>
+            <a:stretch>
+              <a:fillRect/>
+            </a:stretch>
+          </p:blipFill>
+          <p:spPr>
+            <a:xfrm>
+              <a:off x="1409700" y="1552578"/>
+              <a:ext cx="4686300" cy="1543050"/>
+            </a:xfrm>
+            <a:prstGeom prst="rect">
+              <a:avLst/>
+            </a:prstGeom>
+          </p:spPr>
+        </p:pic>
+        <p:grpSp>
+          <p:nvGrpSpPr>
+            <p:cNvPr id="8" name="Group 7">
+              <a:extLst>
+                <a:ext uri="{FF2B5EF4-FFF2-40B4-BE49-F238E27FC236}">
+                  <a16:creationId xmlns:a16="http://schemas.microsoft.com/office/drawing/2014/main" id="{081EF012-D084-42EA-8FC7-D216FD45EC5F}"/>
+                </a:ext>
+              </a:extLst>
+            </p:cNvPr>
+            <p:cNvGrpSpPr/>
+            <p:nvPr/>
+          </p:nvGrpSpPr>
+          <p:grpSpPr>
+            <a:xfrm>
+              <a:off x="1748507" y="3429000"/>
+              <a:ext cx="4008686" cy="1682408"/>
+              <a:chOff x="1748507" y="3429000"/>
+              <a:chExt cx="4008686" cy="1682408"/>
+            </a:xfrm>
+          </p:grpSpPr>
+          <p:pic>
+            <p:nvPicPr>
+              <p:cNvPr id="1030" name="Picture 6" descr="Folder png Images - Free Download on Freepik">
+                <a:extLst>
+                  <a:ext uri="{FF2B5EF4-FFF2-40B4-BE49-F238E27FC236}">
+                    <a16:creationId xmlns:a16="http://schemas.microsoft.com/office/drawing/2014/main" id="{E153316E-7F2E-46A0-803C-E8EA65BD9B51}"/>
+                  </a:ext>
+                </a:extLst>
+              </p:cNvPr>
+              <p:cNvPicPr>
+                <a:picLocks noChangeAspect="1" noChangeArrowheads="1"/>
+              </p:cNvPicPr>
+              <p:nvPr/>
+            </p:nvPicPr>
+            <p:blipFill>
+              <a:blip r:embed="rId3">
+                <a:extLst>
+                  <a:ext uri="{BEBA8EAE-BF5A-486C-A8C5-ECC9F3942E4B}">
+                    <a14:imgProps xmlns:a14="http://schemas.microsoft.com/office/drawing/2010/main">
+                      <a14:imgLayer r:embed="rId4">
+                        <a14:imgEffect>
+                          <a14:backgroundRemoval t="10000" b="90000" l="10000" r="90000"/>
+                        </a14:imgEffect>
+                      </a14:imgLayer>
+                    </a14:imgProps>
+                  </a:ext>
+                  <a:ext uri="{28A0092B-C50C-407E-A947-70E740481C1C}">
+                    <a14:useLocalDpi xmlns:a14="http://schemas.microsoft.com/office/drawing/2010/main" val="0"/>
+                  </a:ext>
+                </a:extLst>
+              </a:blip>
+              <a:srcRect/>
+              <a:stretch>
+                <a:fillRect/>
+              </a:stretch>
+            </p:blipFill>
+            <p:spPr bwMode="auto">
+              <a:xfrm>
+                <a:off x="1748507" y="3429000"/>
+                <a:ext cx="1682408" cy="1682408"/>
+              </a:xfrm>
+              <a:prstGeom prst="rect">
+                <a:avLst/>
+              </a:prstGeom>
+              <a:noFill/>
+              <a:extLst>
+                <a:ext uri="{909E8E84-426E-40DD-AFC4-6F175D3DCCD1}">
+                  <a14:hiddenFill xmlns:a14="http://schemas.microsoft.com/office/drawing/2010/main">
+                    <a:solidFill>
+                      <a:srgbClr val="FFFFFF"/>
+                    </a:solidFill>
+                  </a14:hiddenFill>
+                </a:ext>
+              </a:extLst>
+            </p:spPr>
+          </p:pic>
+          <p:sp>
+            <p:nvSpPr>
+              <p:cNvPr id="6" name="TextBox 5">
+                <a:extLst>
+                  <a:ext uri="{FF2B5EF4-FFF2-40B4-BE49-F238E27FC236}">
+                    <a16:creationId xmlns:a16="http://schemas.microsoft.com/office/drawing/2014/main" id="{6ADA23DA-3FE9-42B1-80CF-8EBCBB6105BE}"/>
+                  </a:ext>
+                </a:extLst>
+              </p:cNvPr>
+              <p:cNvSpPr txBox="1"/>
+              <p:nvPr/>
+            </p:nvSpPr>
+            <p:spPr>
+              <a:xfrm>
+                <a:off x="3430915" y="3560041"/>
+                <a:ext cx="2326278" cy="1420325"/>
+              </a:xfrm>
+              <a:prstGeom prst="rect">
+                <a:avLst/>
+              </a:prstGeom>
+              <a:noFill/>
+            </p:spPr>
+            <p:txBody>
+              <a:bodyPr wrap="none" rtlCol="0">
+                <a:spAutoFit/>
+              </a:bodyPr>
+              <a:lstStyle/>
+              <a:p>
+                <a:pPr marL="342900" indent="-342900">
+                  <a:lnSpc>
+                    <a:spcPct val="150000"/>
+                  </a:lnSpc>
+                  <a:buFont typeface="Arial" panose="020B0604020202020204" pitchFamily="34" charset="0"/>
+                  <a:buChar char="•"/>
+                </a:pPr>
+                <a:r>
+                  <a:rPr lang="en-ID" sz="2000" b="1"/>
+                  <a:t>gambar1.jpg</a:t>
+                </a:r>
+              </a:p>
+              <a:p>
+                <a:pPr marL="342900" indent="-342900">
+                  <a:lnSpc>
+                    <a:spcPct val="150000"/>
+                  </a:lnSpc>
+                  <a:buFont typeface="Arial" panose="020B0604020202020204" pitchFamily="34" charset="0"/>
+                  <a:buChar char="•"/>
+                </a:pPr>
+                <a:r>
+                  <a:rPr lang="en-ID" sz="2000" b="1"/>
+                  <a:t>gambar2.png</a:t>
+                </a:r>
+              </a:p>
+              <a:p>
+                <a:pPr marL="342900" indent="-342900">
+                  <a:lnSpc>
+                    <a:spcPct val="150000"/>
+                  </a:lnSpc>
+                  <a:buFont typeface="Arial" panose="020B0604020202020204" pitchFamily="34" charset="0"/>
+                  <a:buChar char="•"/>
+                </a:pPr>
+                <a:r>
+                  <a:rPr lang="en-ID" sz="2000" b="1"/>
+                  <a:t>gambar4.webp</a:t>
+                </a:r>
+              </a:p>
+            </p:txBody>
+          </p:sp>
+        </p:grpSp>
+      </p:grpSp>
+      <p:pic>
+        <p:nvPicPr>
+          <p:cNvPr id="12" name="Picture 11">
+            <a:extLst>
+              <a:ext uri="{FF2B5EF4-FFF2-40B4-BE49-F238E27FC236}">
+                <a16:creationId xmlns:a16="http://schemas.microsoft.com/office/drawing/2014/main" id="{9755F931-469B-4FD4-A0C1-14AA3798F124}"/>
+              </a:ext>
+            </a:extLst>
+          </p:cNvPr>
+          <p:cNvPicPr>
+            <a:picLocks noChangeAspect="1"/>
+          </p:cNvPicPr>
+          <p:nvPr/>
+        </p:nvPicPr>
+        <p:blipFill>
+          <a:blip r:embed="rId5"/>
+          <a:stretch>
+            <a:fillRect/>
+          </a:stretch>
+        </p:blipFill>
+        <p:spPr>
+          <a:xfrm>
+            <a:off x="7293533" y="931432"/>
+            <a:ext cx="4160480" cy="5451231"/>
+          </a:xfrm>
+          <a:prstGeom prst="rect">
+            <a:avLst/>
+          </a:prstGeom>
+        </p:spPr>
+      </p:pic>
+      <p:sp>
+        <p:nvSpPr>
+          <p:cNvPr id="14" name="Arrow: Right 13">
+            <a:extLst>
+              <a:ext uri="{FF2B5EF4-FFF2-40B4-BE49-F238E27FC236}">
+                <a16:creationId xmlns:a16="http://schemas.microsoft.com/office/drawing/2014/main" id="{67D55733-1E58-4894-A8D6-7FE4968595AB}"/>
+              </a:ext>
+            </a:extLst>
+          </p:cNvPr>
+          <p:cNvSpPr/>
+          <p:nvPr/>
+        </p:nvSpPr>
+        <p:spPr>
+          <a:xfrm>
+            <a:off x="5765424" y="3061594"/>
+            <a:ext cx="1186972" cy="464413"/>
+          </a:xfrm>
+          <a:prstGeom prst="rightArrow">
+            <a:avLst/>
+          </a:prstGeom>
+          <a:ln>
+            <a:solidFill>
+              <a:schemeClr val="tx1">
+                <a:lumMod val="50000"/>
+              </a:schemeClr>
+            </a:solidFill>
+          </a:ln>
+        </p:spPr>
+        <p:style>
+          <a:lnRef idx="1">
+            <a:schemeClr val="dk1"/>
+          </a:lnRef>
+          <a:fillRef idx="2">
+            <a:schemeClr val="dk1"/>
+          </a:fillRef>
+          <a:effectRef idx="1">
+            <a:schemeClr val="dk1"/>
+          </a:effectRef>
+          <a:fontRef idx="minor">
+            <a:schemeClr val="dk1"/>
+          </a:fontRef>
+        </p:style>
+        <p:txBody>
+          <a:bodyPr rtlCol="0" anchor="ctr"/>
+          <a:lstStyle/>
+          <a:p>
+            <a:pPr algn="ctr"/>
+            <a:endParaRPr lang="en-ID"/>
+          </a:p>
+        </p:txBody>
+      </p:sp>
     </p:spTree>
     <p:extLst>
       <p:ext uri="{BB962C8B-B14F-4D97-AF65-F5344CB8AC3E}">

</xml_diff>

<commit_message>
CHORE: delete cache and update doc_app_launcher
</commit_message>
<xml_diff>
--- a/DOC_APP_LAUNCHER.pptx
+++ b/DOC_APP_LAUNCHER.pptx
@@ -10,6 +10,13 @@
     <p:sldId id="258" r:id="rId4"/>
     <p:sldId id="259" r:id="rId5"/>
     <p:sldId id="260" r:id="rId6"/>
+    <p:sldId id="261" r:id="rId7"/>
+    <p:sldId id="262" r:id="rId8"/>
+    <p:sldId id="263" r:id="rId9"/>
+    <p:sldId id="264" r:id="rId10"/>
+    <p:sldId id="265" r:id="rId11"/>
+    <p:sldId id="266" r:id="rId12"/>
+    <p:sldId id="267" r:id="rId13"/>
   </p:sldIdLst>
   <p:sldSz cx="12192000" cy="6858000"/>
   <p:notesSz cx="6858000" cy="9144000"/>
@@ -301,7 +308,7 @@
           <a:p>
             <a:fld id="{E35A2BDE-CACB-4F2A-BB37-56B6363C31C8}" type="datetimeFigureOut">
               <a:rPr lang="en-ID" smtClean="0"/>
-              <a:t>06/02/2026</a:t>
+              <a:t>07/02/2026</a:t>
             </a:fld>
             <a:endParaRPr lang="en-ID"/>
           </a:p>
@@ -599,7 +606,7 @@
           <a:p>
             <a:fld id="{E35A2BDE-CACB-4F2A-BB37-56B6363C31C8}" type="datetimeFigureOut">
               <a:rPr lang="en-ID" smtClean="0"/>
-              <a:t>06/02/2026</a:t>
+              <a:t>07/02/2026</a:t>
             </a:fld>
             <a:endParaRPr lang="en-ID"/>
           </a:p>
@@ -791,7 +798,7 @@
           <a:p>
             <a:fld id="{E35A2BDE-CACB-4F2A-BB37-56B6363C31C8}" type="datetimeFigureOut">
               <a:rPr lang="en-ID" smtClean="0"/>
-              <a:t>06/02/2026</a:t>
+              <a:t>07/02/2026</a:t>
             </a:fld>
             <a:endParaRPr lang="en-ID"/>
           </a:p>
@@ -1052,7 +1059,7 @@
           <a:p>
             <a:fld id="{E35A2BDE-CACB-4F2A-BB37-56B6363C31C8}" type="datetimeFigureOut">
               <a:rPr lang="en-ID" smtClean="0"/>
-              <a:t>06/02/2026</a:t>
+              <a:t>07/02/2026</a:t>
             </a:fld>
             <a:endParaRPr lang="en-ID"/>
           </a:p>
@@ -1476,7 +1483,7 @@
           <a:p>
             <a:fld id="{E35A2BDE-CACB-4F2A-BB37-56B6363C31C8}" type="datetimeFigureOut">
               <a:rPr lang="en-ID" smtClean="0"/>
-              <a:t>06/02/2026</a:t>
+              <a:t>07/02/2026</a:t>
             </a:fld>
             <a:endParaRPr lang="en-ID"/>
           </a:p>
@@ -2013,7 +2020,7 @@
           <a:p>
             <a:fld id="{E35A2BDE-CACB-4F2A-BB37-56B6363C31C8}" type="datetimeFigureOut">
               <a:rPr lang="en-ID" smtClean="0"/>
-              <a:t>06/02/2026</a:t>
+              <a:t>07/02/2026</a:t>
             </a:fld>
             <a:endParaRPr lang="en-ID"/>
           </a:p>
@@ -2877,7 +2884,7 @@
           <a:p>
             <a:fld id="{E35A2BDE-CACB-4F2A-BB37-56B6363C31C8}" type="datetimeFigureOut">
               <a:rPr lang="en-ID" smtClean="0"/>
-              <a:t>06/02/2026</a:t>
+              <a:t>07/02/2026</a:t>
             </a:fld>
             <a:endParaRPr lang="en-ID"/>
           </a:p>
@@ -3047,7 +3054,7 @@
           <a:p>
             <a:fld id="{E35A2BDE-CACB-4F2A-BB37-56B6363C31C8}" type="datetimeFigureOut">
               <a:rPr lang="en-ID" smtClean="0"/>
-              <a:t>06/02/2026</a:t>
+              <a:t>07/02/2026</a:t>
             </a:fld>
             <a:endParaRPr lang="en-ID"/>
           </a:p>
@@ -3231,7 +3238,7 @@
           <a:p>
             <a:fld id="{E35A2BDE-CACB-4F2A-BB37-56B6363C31C8}" type="datetimeFigureOut">
               <a:rPr lang="en-ID" smtClean="0"/>
-              <a:t>06/02/2026</a:t>
+              <a:t>07/02/2026</a:t>
             </a:fld>
             <a:endParaRPr lang="en-ID"/>
           </a:p>
@@ -3401,7 +3408,7 @@
           <a:p>
             <a:fld id="{E35A2BDE-CACB-4F2A-BB37-56B6363C31C8}" type="datetimeFigureOut">
               <a:rPr lang="en-ID" smtClean="0"/>
-              <a:t>06/02/2026</a:t>
+              <a:t>07/02/2026</a:t>
             </a:fld>
             <a:endParaRPr lang="en-ID"/>
           </a:p>
@@ -3645,7 +3652,7 @@
           <a:p>
             <a:fld id="{E35A2BDE-CACB-4F2A-BB37-56B6363C31C8}" type="datetimeFigureOut">
               <a:rPr lang="en-ID" smtClean="0"/>
-              <a:t>06/02/2026</a:t>
+              <a:t>07/02/2026</a:t>
             </a:fld>
             <a:endParaRPr lang="en-ID"/>
           </a:p>
@@ -3881,7 +3888,7 @@
           <a:p>
             <a:fld id="{E35A2BDE-CACB-4F2A-BB37-56B6363C31C8}" type="datetimeFigureOut">
               <a:rPr lang="en-ID" smtClean="0"/>
-              <a:t>06/02/2026</a:t>
+              <a:t>07/02/2026</a:t>
             </a:fld>
             <a:endParaRPr lang="en-ID"/>
           </a:p>
@@ -4347,7 +4354,7 @@
           <a:p>
             <a:fld id="{E35A2BDE-CACB-4F2A-BB37-56B6363C31C8}" type="datetimeFigureOut">
               <a:rPr lang="en-ID" smtClean="0"/>
-              <a:t>06/02/2026</a:t>
+              <a:t>07/02/2026</a:t>
             </a:fld>
             <a:endParaRPr lang="en-ID"/>
           </a:p>
@@ -4465,7 +4472,7 @@
           <a:p>
             <a:fld id="{E35A2BDE-CACB-4F2A-BB37-56B6363C31C8}" type="datetimeFigureOut">
               <a:rPr lang="en-ID" smtClean="0"/>
-              <a:t>06/02/2026</a:t>
+              <a:t>07/02/2026</a:t>
             </a:fld>
             <a:endParaRPr lang="en-ID"/>
           </a:p>
@@ -4560,7 +4567,7 @@
           <a:p>
             <a:fld id="{E35A2BDE-CACB-4F2A-BB37-56B6363C31C8}" type="datetimeFigureOut">
               <a:rPr lang="en-ID" smtClean="0"/>
-              <a:t>06/02/2026</a:t>
+              <a:t>07/02/2026</a:t>
             </a:fld>
             <a:endParaRPr lang="en-ID"/>
           </a:p>
@@ -4815,7 +4822,7 @@
           <a:p>
             <a:fld id="{E35A2BDE-CACB-4F2A-BB37-56B6363C31C8}" type="datetimeFigureOut">
               <a:rPr lang="en-ID" smtClean="0"/>
-              <a:t>06/02/2026</a:t>
+              <a:t>07/02/2026</a:t>
             </a:fld>
             <a:endParaRPr lang="en-ID"/>
           </a:p>
@@ -5115,7 +5122,7 @@
           <a:p>
             <a:fld id="{E35A2BDE-CACB-4F2A-BB37-56B6363C31C8}" type="datetimeFigureOut">
               <a:rPr lang="en-ID" smtClean="0"/>
-              <a:t>06/02/2026</a:t>
+              <a:t>07/02/2026</a:t>
             </a:fld>
             <a:endParaRPr lang="en-ID"/>
           </a:p>
@@ -5349,7 +5356,7 @@
           <a:p>
             <a:fld id="{E35A2BDE-CACB-4F2A-BB37-56B6363C31C8}" type="datetimeFigureOut">
               <a:rPr lang="en-ID" smtClean="0"/>
-              <a:t>06/02/2026</a:t>
+              <a:t>07/02/2026</a:t>
             </a:fld>
             <a:endParaRPr lang="en-ID"/>
           </a:p>
@@ -6100,6 +6107,322 @@
 </p:sld>
 </file>
 
+<file path=ppt/slides/slide10.xml><?xml version="1.0" encoding="utf-8"?>
+<p:sld xmlns:a="http://schemas.openxmlformats.org/drawingml/2006/main" xmlns:r="http://schemas.openxmlformats.org/officeDocument/2006/relationships" xmlns:p="http://schemas.openxmlformats.org/presentationml/2006/main">
+  <p:cSld>
+    <p:spTree>
+      <p:nvGrpSpPr>
+        <p:cNvPr id="1" name=""/>
+        <p:cNvGrpSpPr/>
+        <p:nvPr/>
+      </p:nvGrpSpPr>
+      <p:grpSpPr>
+        <a:xfrm>
+          <a:off x="0" y="0"/>
+          <a:ext cx="0" cy="0"/>
+          <a:chOff x="0" y="0"/>
+          <a:chExt cx="0" cy="0"/>
+        </a:xfrm>
+      </p:grpSpPr>
+      <p:sp>
+        <p:nvSpPr>
+          <p:cNvPr id="2" name="Title 1">
+            <a:extLst>
+              <a:ext uri="{FF2B5EF4-FFF2-40B4-BE49-F238E27FC236}">
+                <a16:creationId xmlns:a16="http://schemas.microsoft.com/office/drawing/2014/main" id="{D1B60822-64B8-477D-BD04-B7CFA687E207}"/>
+              </a:ext>
+            </a:extLst>
+          </p:cNvPr>
+          <p:cNvSpPr>
+            <a:spLocks noGrp="1"/>
+          </p:cNvSpPr>
+          <p:nvPr>
+            <p:ph type="title"/>
+          </p:nvPr>
+        </p:nvSpPr>
+        <p:spPr/>
+        <p:txBody>
+          <a:bodyPr/>
+          <a:lstStyle/>
+          <a:p>
+            <a:r>
+              <a:rPr lang="en-US"/>
+              <a:t>Download DPM Prabayar</a:t>
+            </a:r>
+          </a:p>
+        </p:txBody>
+      </p:sp>
+      <p:pic>
+        <p:nvPicPr>
+          <p:cNvPr id="5" name="Content Placeholder 4">
+            <a:extLst>
+              <a:ext uri="{FF2B5EF4-FFF2-40B4-BE49-F238E27FC236}">
+                <a16:creationId xmlns:a16="http://schemas.microsoft.com/office/drawing/2014/main" id="{0EAABE2C-32C4-4FC2-88D8-2EC0C551EE34}"/>
+              </a:ext>
+            </a:extLst>
+          </p:cNvPr>
+          <p:cNvPicPr>
+            <a:picLocks noGrp="1" noChangeAspect="1"/>
+          </p:cNvPicPr>
+          <p:nvPr>
+            <p:ph idx="1"/>
+          </p:nvPr>
+        </p:nvPicPr>
+        <p:blipFill>
+          <a:blip r:embed="rId2">
+            <a:extLst>
+              <a:ext uri="{28A0092B-C50C-407E-A947-70E740481C1C}">
+                <a14:useLocalDpi xmlns:a14="http://schemas.microsoft.com/office/drawing/2010/main" val="0"/>
+              </a:ext>
+            </a:extLst>
+          </a:blip>
+          <a:stretch>
+            <a:fillRect/>
+          </a:stretch>
+        </p:blipFill>
+        <p:spPr>
+          <a:xfrm>
+            <a:off x="2803786" y="1731963"/>
+            <a:ext cx="6574903" cy="4059237"/>
+          </a:xfrm>
+        </p:spPr>
+      </p:pic>
+    </p:spTree>
+    <p:extLst>
+      <p:ext uri="{BB962C8B-B14F-4D97-AF65-F5344CB8AC3E}">
+        <p14:creationId xmlns:p14="http://schemas.microsoft.com/office/powerpoint/2010/main" val="3612821614"/>
+      </p:ext>
+    </p:extLst>
+  </p:cSld>
+  <p:clrMapOvr>
+    <a:masterClrMapping/>
+  </p:clrMapOvr>
+</p:sld>
+</file>
+
+<file path=ppt/slides/slide11.xml><?xml version="1.0" encoding="utf-8"?>
+<p:sld xmlns:a="http://schemas.openxmlformats.org/drawingml/2006/main" xmlns:r="http://schemas.openxmlformats.org/officeDocument/2006/relationships" xmlns:p="http://schemas.openxmlformats.org/presentationml/2006/main">
+  <p:cSld>
+    <p:spTree>
+      <p:nvGrpSpPr>
+        <p:cNvPr id="1" name=""/>
+        <p:cNvGrpSpPr/>
+        <p:nvPr/>
+      </p:nvGrpSpPr>
+      <p:grpSpPr>
+        <a:xfrm>
+          <a:off x="0" y="0"/>
+          <a:ext cx="0" cy="0"/>
+          <a:chOff x="0" y="0"/>
+          <a:chExt cx="0" cy="0"/>
+        </a:xfrm>
+      </p:grpSpPr>
+      <p:sp>
+        <p:nvSpPr>
+          <p:cNvPr id="2" name="Title 1">
+            <a:extLst>
+              <a:ext uri="{FF2B5EF4-FFF2-40B4-BE49-F238E27FC236}">
+                <a16:creationId xmlns:a16="http://schemas.microsoft.com/office/drawing/2014/main" id="{D1B60822-64B8-477D-BD04-B7CFA687E207}"/>
+              </a:ext>
+            </a:extLst>
+          </p:cNvPr>
+          <p:cNvSpPr>
+            <a:spLocks noGrp="1"/>
+          </p:cNvSpPr>
+          <p:nvPr>
+            <p:ph type="title"/>
+          </p:nvPr>
+        </p:nvSpPr>
+        <p:spPr/>
+        <p:txBody>
+          <a:bodyPr/>
+          <a:lstStyle/>
+          <a:p>
+            <a:r>
+              <a:rPr lang="en-US"/>
+              <a:t>Download Foto ACMT</a:t>
+            </a:r>
+          </a:p>
+        </p:txBody>
+      </p:sp>
+      <p:pic>
+        <p:nvPicPr>
+          <p:cNvPr id="5" name="Content Placeholder 4">
+            <a:extLst>
+              <a:ext uri="{FF2B5EF4-FFF2-40B4-BE49-F238E27FC236}">
+                <a16:creationId xmlns:a16="http://schemas.microsoft.com/office/drawing/2014/main" id="{9A582CBC-729B-4701-BB78-D4711129D974}"/>
+              </a:ext>
+            </a:extLst>
+          </p:cNvPr>
+          <p:cNvPicPr>
+            <a:picLocks noGrp="1" noChangeAspect="1"/>
+          </p:cNvPicPr>
+          <p:nvPr>
+            <p:ph idx="1"/>
+          </p:nvPr>
+        </p:nvPicPr>
+        <p:blipFill>
+          <a:blip r:embed="rId2">
+            <a:extLst>
+              <a:ext uri="{28A0092B-C50C-407E-A947-70E740481C1C}">
+                <a14:useLocalDpi xmlns:a14="http://schemas.microsoft.com/office/drawing/2010/main" val="0"/>
+              </a:ext>
+            </a:extLst>
+          </a:blip>
+          <a:stretch>
+            <a:fillRect/>
+          </a:stretch>
+        </p:blipFill>
+        <p:spPr>
+          <a:xfrm>
+            <a:off x="2803786" y="1731963"/>
+            <a:ext cx="6574903" cy="4059237"/>
+          </a:xfrm>
+        </p:spPr>
+      </p:pic>
+    </p:spTree>
+    <p:extLst>
+      <p:ext uri="{BB962C8B-B14F-4D97-AF65-F5344CB8AC3E}">
+        <p14:creationId xmlns:p14="http://schemas.microsoft.com/office/powerpoint/2010/main" val="1672949464"/>
+      </p:ext>
+    </p:extLst>
+  </p:cSld>
+  <p:clrMapOvr>
+    <a:masterClrMapping/>
+  </p:clrMapOvr>
+</p:sld>
+</file>
+
+<file path=ppt/slides/slide12.xml><?xml version="1.0" encoding="utf-8"?>
+<p:sld xmlns:a="http://schemas.openxmlformats.org/drawingml/2006/main" xmlns:r="http://schemas.openxmlformats.org/officeDocument/2006/relationships" xmlns:p="http://schemas.openxmlformats.org/presentationml/2006/main">
+  <p:cSld>
+    <p:spTree>
+      <p:nvGrpSpPr>
+        <p:cNvPr id="1" name=""/>
+        <p:cNvGrpSpPr/>
+        <p:nvPr/>
+      </p:nvGrpSpPr>
+      <p:grpSpPr>
+        <a:xfrm>
+          <a:off x="0" y="0"/>
+          <a:ext cx="0" cy="0"/>
+          <a:chOff x="0" y="0"/>
+          <a:chExt cx="0" cy="0"/>
+        </a:xfrm>
+      </p:grpSpPr>
+      <p:sp>
+        <p:nvSpPr>
+          <p:cNvPr id="2" name="Title 1">
+            <a:extLst>
+              <a:ext uri="{FF2B5EF4-FFF2-40B4-BE49-F238E27FC236}">
+                <a16:creationId xmlns:a16="http://schemas.microsoft.com/office/drawing/2014/main" id="{A4D22ABF-E405-4242-92EC-CDCD0064CFAA}"/>
+              </a:ext>
+            </a:extLst>
+          </p:cNvPr>
+          <p:cNvSpPr>
+            <a:spLocks noGrp="1"/>
+          </p:cNvSpPr>
+          <p:nvPr>
+            <p:ph type="title"/>
+          </p:nvPr>
+        </p:nvSpPr>
+        <p:spPr/>
+        <p:txBody>
+          <a:bodyPr>
+            <a:normAutofit fontScale="90000"/>
+          </a:bodyPr>
+          <a:lstStyle/>
+          <a:p>
+            <a:r>
+              <a:rPr lang="en-US"/>
+              <a:t>Automatisasi Info ACMT ( Pascabayar, Prabayar )</a:t>
+            </a:r>
+          </a:p>
+        </p:txBody>
+      </p:sp>
+      <p:pic>
+        <p:nvPicPr>
+          <p:cNvPr id="6" name="Content Placeholder 5">
+            <a:extLst>
+              <a:ext uri="{FF2B5EF4-FFF2-40B4-BE49-F238E27FC236}">
+                <a16:creationId xmlns:a16="http://schemas.microsoft.com/office/drawing/2014/main" id="{1A2EE860-D9C4-420E-BD4D-1607CEEEFE97}"/>
+              </a:ext>
+            </a:extLst>
+          </p:cNvPr>
+          <p:cNvPicPr>
+            <a:picLocks noGrp="1" noChangeAspect="1"/>
+          </p:cNvPicPr>
+          <p:nvPr>
+            <p:ph sz="half" idx="1"/>
+          </p:nvPr>
+        </p:nvPicPr>
+        <p:blipFill>
+          <a:blip r:embed="rId2">
+            <a:extLst>
+              <a:ext uri="{28A0092B-C50C-407E-A947-70E740481C1C}">
+                <a14:useLocalDpi xmlns:a14="http://schemas.microsoft.com/office/drawing/2010/main" val="0"/>
+              </a:ext>
+            </a:extLst>
+          </a:blip>
+          <a:stretch>
+            <a:fillRect/>
+          </a:stretch>
+        </p:blipFill>
+        <p:spPr>
+          <a:xfrm>
+            <a:off x="914400" y="2199798"/>
+            <a:ext cx="5059363" cy="3123567"/>
+          </a:xfrm>
+        </p:spPr>
+      </p:pic>
+      <p:pic>
+        <p:nvPicPr>
+          <p:cNvPr id="8" name="Content Placeholder 7">
+            <a:extLst>
+              <a:ext uri="{FF2B5EF4-FFF2-40B4-BE49-F238E27FC236}">
+                <a16:creationId xmlns:a16="http://schemas.microsoft.com/office/drawing/2014/main" id="{325CDBD9-C14C-4E81-8CD8-F3718B38EB55}"/>
+              </a:ext>
+            </a:extLst>
+          </p:cNvPr>
+          <p:cNvPicPr>
+            <a:picLocks noGrp="1" noChangeAspect="1"/>
+          </p:cNvPicPr>
+          <p:nvPr>
+            <p:ph sz="half" idx="2"/>
+          </p:nvPr>
+        </p:nvPicPr>
+        <p:blipFill>
+          <a:blip r:embed="rId3">
+            <a:extLst>
+              <a:ext uri="{28A0092B-C50C-407E-A947-70E740481C1C}">
+                <a14:useLocalDpi xmlns:a14="http://schemas.microsoft.com/office/drawing/2010/main" val="0"/>
+              </a:ext>
+            </a:extLst>
+          </a:blip>
+          <a:stretch>
+            <a:fillRect/>
+          </a:stretch>
+        </p:blipFill>
+        <p:spPr>
+          <a:xfrm>
+            <a:off x="6202363" y="2197838"/>
+            <a:ext cx="5065712" cy="3127486"/>
+          </a:xfrm>
+        </p:spPr>
+      </p:pic>
+    </p:spTree>
+    <p:extLst>
+      <p:ext uri="{BB962C8B-B14F-4D97-AF65-F5344CB8AC3E}">
+        <p14:creationId xmlns:p14="http://schemas.microsoft.com/office/powerpoint/2010/main" val="1868453801"/>
+      </p:ext>
+    </p:extLst>
+  </p:cSld>
+  <p:clrMapOvr>
+    <a:masterClrMapping/>
+  </p:clrMapOvr>
+</p:sld>
+</file>
+
 <file path=ppt/slides/slide2.xml><?xml version="1.0" encoding="utf-8"?>
 <p:sld xmlns:a="http://schemas.openxmlformats.org/drawingml/2006/main" xmlns:r="http://schemas.openxmlformats.org/officeDocument/2006/relationships" xmlns:p="http://schemas.openxmlformats.org/presentationml/2006/main">
   <p:cSld>
@@ -6140,7 +6463,7 @@
           <a:p>
             <a:r>
               <a:rPr lang="en-US"/>
-              <a:t>APA ITU APP LAUNCHER</a:t>
+              <a:t>APA ITU APP LAUNCHER ?</a:t>
             </a:r>
             <a:endParaRPr lang="en-ID"/>
           </a:p>
@@ -6270,7 +6593,7 @@
           <a:p>
             <a:r>
               <a:rPr lang="en-US"/>
-              <a:t>Input gambar</a:t>
+              <a:t>Input Gambar</a:t>
             </a:r>
             <a:endParaRPr lang="en-ID"/>
           </a:p>
@@ -6278,10 +6601,10 @@
       </p:sp>
       <p:pic>
         <p:nvPicPr>
-          <p:cNvPr id="5" name="Content Placeholder 4">
+          <p:cNvPr id="7" name="Content Placeholder 6">
             <a:extLst>
               <a:ext uri="{FF2B5EF4-FFF2-40B4-BE49-F238E27FC236}">
-                <a16:creationId xmlns:a16="http://schemas.microsoft.com/office/drawing/2014/main" id="{11BFDE0A-E193-4FB3-8D48-2DEE729387F6}"/>
+                <a16:creationId xmlns:a16="http://schemas.microsoft.com/office/drawing/2014/main" id="{FD47D3AC-A240-47E2-A71F-97CB8681A5E6}"/>
               </a:ext>
             </a:extLst>
           </p:cNvPr>
@@ -6796,6 +7119,378 @@
 </p:sld>
 </file>
 
+<file path=ppt/slides/slide6.xml><?xml version="1.0" encoding="utf-8"?>
+<p:sld xmlns:a="http://schemas.openxmlformats.org/drawingml/2006/main" xmlns:r="http://schemas.openxmlformats.org/officeDocument/2006/relationships" xmlns:p="http://schemas.openxmlformats.org/presentationml/2006/main">
+  <p:cSld>
+    <p:spTree>
+      <p:nvGrpSpPr>
+        <p:cNvPr id="1" name=""/>
+        <p:cNvGrpSpPr/>
+        <p:nvPr/>
+      </p:nvGrpSpPr>
+      <p:grpSpPr>
+        <a:xfrm>
+          <a:off x="0" y="0"/>
+          <a:ext cx="0" cy="0"/>
+          <a:chOff x="0" y="0"/>
+          <a:chExt cx="0" cy="0"/>
+        </a:xfrm>
+      </p:grpSpPr>
+      <p:sp>
+        <p:nvSpPr>
+          <p:cNvPr id="2" name="Title 1">
+            <a:extLst>
+              <a:ext uri="{FF2B5EF4-FFF2-40B4-BE49-F238E27FC236}">
+                <a16:creationId xmlns:a16="http://schemas.microsoft.com/office/drawing/2014/main" id="{20D036FE-3E50-4315-80A9-2E814041AF6F}"/>
+              </a:ext>
+            </a:extLst>
+          </p:cNvPr>
+          <p:cNvSpPr>
+            <a:spLocks noGrp="1"/>
+          </p:cNvSpPr>
+          <p:nvPr>
+            <p:ph type="title"/>
+          </p:nvPr>
+        </p:nvSpPr>
+        <p:spPr/>
+        <p:txBody>
+          <a:bodyPr/>
+          <a:lstStyle/>
+          <a:p>
+            <a:r>
+              <a:rPr lang="en-ID"/>
+              <a:t>Invoice &amp; 601</a:t>
+            </a:r>
+          </a:p>
+        </p:txBody>
+      </p:sp>
+      <p:pic>
+        <p:nvPicPr>
+          <p:cNvPr id="11" name="Content Placeholder 10">
+            <a:extLst>
+              <a:ext uri="{FF2B5EF4-FFF2-40B4-BE49-F238E27FC236}">
+                <a16:creationId xmlns:a16="http://schemas.microsoft.com/office/drawing/2014/main" id="{05A5B55B-E21F-4E1A-B2A1-607C1D7ABE6E}"/>
+              </a:ext>
+            </a:extLst>
+          </p:cNvPr>
+          <p:cNvPicPr>
+            <a:picLocks noGrp="1" noChangeAspect="1"/>
+          </p:cNvPicPr>
+          <p:nvPr>
+            <p:ph idx="1"/>
+          </p:nvPr>
+        </p:nvPicPr>
+        <p:blipFill>
+          <a:blip r:embed="rId2">
+            <a:extLst>
+              <a:ext uri="{28A0092B-C50C-407E-A947-70E740481C1C}">
+                <a14:useLocalDpi xmlns:a14="http://schemas.microsoft.com/office/drawing/2010/main" val="0"/>
+              </a:ext>
+            </a:extLst>
+          </a:blip>
+          <a:stretch>
+            <a:fillRect/>
+          </a:stretch>
+        </p:blipFill>
+        <p:spPr>
+          <a:xfrm>
+            <a:off x="2803786" y="1731963"/>
+            <a:ext cx="6574903" cy="4059237"/>
+          </a:xfrm>
+        </p:spPr>
+      </p:pic>
+    </p:spTree>
+    <p:extLst>
+      <p:ext uri="{BB962C8B-B14F-4D97-AF65-F5344CB8AC3E}">
+        <p14:creationId xmlns:p14="http://schemas.microsoft.com/office/powerpoint/2010/main" val="973494713"/>
+      </p:ext>
+    </p:extLst>
+  </p:cSld>
+  <p:clrMapOvr>
+    <a:masterClrMapping/>
+  </p:clrMapOvr>
+</p:sld>
+</file>
+
+<file path=ppt/slides/slide7.xml><?xml version="1.0" encoding="utf-8"?>
+<p:sld xmlns:a="http://schemas.openxmlformats.org/drawingml/2006/main" xmlns:r="http://schemas.openxmlformats.org/officeDocument/2006/relationships" xmlns:p="http://schemas.openxmlformats.org/presentationml/2006/main">
+  <p:cSld>
+    <p:spTree>
+      <p:nvGrpSpPr>
+        <p:cNvPr id="1" name=""/>
+        <p:cNvGrpSpPr/>
+        <p:nvPr/>
+      </p:nvGrpSpPr>
+      <p:grpSpPr>
+        <a:xfrm>
+          <a:off x="0" y="0"/>
+          <a:ext cx="0" cy="0"/>
+          <a:chOff x="0" y="0"/>
+          <a:chExt cx="0" cy="0"/>
+        </a:xfrm>
+      </p:grpSpPr>
+      <p:sp>
+        <p:nvSpPr>
+          <p:cNvPr id="2" name="Title 1">
+            <a:extLst>
+              <a:ext uri="{FF2B5EF4-FFF2-40B4-BE49-F238E27FC236}">
+                <a16:creationId xmlns:a16="http://schemas.microsoft.com/office/drawing/2014/main" id="{D1B60822-64B8-477D-BD04-B7CFA687E207}"/>
+              </a:ext>
+            </a:extLst>
+          </p:cNvPr>
+          <p:cNvSpPr>
+            <a:spLocks noGrp="1"/>
+          </p:cNvSpPr>
+          <p:nvPr>
+            <p:ph type="title"/>
+          </p:nvPr>
+        </p:nvSpPr>
+        <p:spPr/>
+        <p:txBody>
+          <a:bodyPr/>
+          <a:lstStyle/>
+          <a:p>
+            <a:r>
+              <a:rPr lang="en-US"/>
+              <a:t>Per - Petugas</a:t>
+            </a:r>
+          </a:p>
+        </p:txBody>
+      </p:sp>
+      <p:pic>
+        <p:nvPicPr>
+          <p:cNvPr id="5" name="Content Placeholder 4">
+            <a:extLst>
+              <a:ext uri="{FF2B5EF4-FFF2-40B4-BE49-F238E27FC236}">
+                <a16:creationId xmlns:a16="http://schemas.microsoft.com/office/drawing/2014/main" id="{825F162B-39C1-40F0-843C-96C3E854E924}"/>
+              </a:ext>
+            </a:extLst>
+          </p:cNvPr>
+          <p:cNvPicPr>
+            <a:picLocks noGrp="1" noChangeAspect="1"/>
+          </p:cNvPicPr>
+          <p:nvPr>
+            <p:ph idx="1"/>
+          </p:nvPr>
+        </p:nvPicPr>
+        <p:blipFill>
+          <a:blip r:embed="rId2">
+            <a:extLst>
+              <a:ext uri="{28A0092B-C50C-407E-A947-70E740481C1C}">
+                <a14:useLocalDpi xmlns:a14="http://schemas.microsoft.com/office/drawing/2010/main" val="0"/>
+              </a:ext>
+            </a:extLst>
+          </a:blip>
+          <a:stretch>
+            <a:fillRect/>
+          </a:stretch>
+        </p:blipFill>
+        <p:spPr>
+          <a:xfrm>
+            <a:off x="2803786" y="1731963"/>
+            <a:ext cx="6574903" cy="4059237"/>
+          </a:xfrm>
+        </p:spPr>
+      </p:pic>
+    </p:spTree>
+    <p:extLst>
+      <p:ext uri="{BB962C8B-B14F-4D97-AF65-F5344CB8AC3E}">
+        <p14:creationId xmlns:p14="http://schemas.microsoft.com/office/powerpoint/2010/main" val="672872507"/>
+      </p:ext>
+    </p:extLst>
+  </p:cSld>
+  <p:clrMapOvr>
+    <a:masterClrMapping/>
+  </p:clrMapOvr>
+</p:sld>
+</file>
+
+<file path=ppt/slides/slide8.xml><?xml version="1.0" encoding="utf-8"?>
+<p:sld xmlns:a="http://schemas.openxmlformats.org/drawingml/2006/main" xmlns:r="http://schemas.openxmlformats.org/officeDocument/2006/relationships" xmlns:p="http://schemas.openxmlformats.org/presentationml/2006/main">
+  <p:cSld>
+    <p:spTree>
+      <p:nvGrpSpPr>
+        <p:cNvPr id="1" name=""/>
+        <p:cNvGrpSpPr/>
+        <p:nvPr/>
+      </p:nvGrpSpPr>
+      <p:grpSpPr>
+        <a:xfrm>
+          <a:off x="0" y="0"/>
+          <a:ext cx="0" cy="0"/>
+          <a:chOff x="0" y="0"/>
+          <a:chExt cx="0" cy="0"/>
+        </a:xfrm>
+      </p:grpSpPr>
+      <p:sp>
+        <p:nvSpPr>
+          <p:cNvPr id="2" name="Title 1">
+            <a:extLst>
+              <a:ext uri="{FF2B5EF4-FFF2-40B4-BE49-F238E27FC236}">
+                <a16:creationId xmlns:a16="http://schemas.microsoft.com/office/drawing/2014/main" id="{D1B60822-64B8-477D-BD04-B7CFA687E207}"/>
+              </a:ext>
+            </a:extLst>
+          </p:cNvPr>
+          <p:cNvSpPr>
+            <a:spLocks noGrp="1"/>
+          </p:cNvSpPr>
+          <p:nvPr>
+            <p:ph type="title"/>
+          </p:nvPr>
+        </p:nvSpPr>
+        <p:spPr/>
+        <p:txBody>
+          <a:bodyPr/>
+          <a:lstStyle/>
+          <a:p>
+            <a:r>
+              <a:rPr lang="en-US"/>
+              <a:t>Cari Idpel di PDF</a:t>
+            </a:r>
+          </a:p>
+        </p:txBody>
+      </p:sp>
+      <p:pic>
+        <p:nvPicPr>
+          <p:cNvPr id="5" name="Content Placeholder 4">
+            <a:extLst>
+              <a:ext uri="{FF2B5EF4-FFF2-40B4-BE49-F238E27FC236}">
+                <a16:creationId xmlns:a16="http://schemas.microsoft.com/office/drawing/2014/main" id="{B7C6A5DC-3B35-423A-A711-316F852B4E61}"/>
+              </a:ext>
+            </a:extLst>
+          </p:cNvPr>
+          <p:cNvPicPr>
+            <a:picLocks noGrp="1" noChangeAspect="1"/>
+          </p:cNvPicPr>
+          <p:nvPr>
+            <p:ph idx="1"/>
+          </p:nvPr>
+        </p:nvPicPr>
+        <p:blipFill>
+          <a:blip r:embed="rId2">
+            <a:extLst>
+              <a:ext uri="{28A0092B-C50C-407E-A947-70E740481C1C}">
+                <a14:useLocalDpi xmlns:a14="http://schemas.microsoft.com/office/drawing/2010/main" val="0"/>
+              </a:ext>
+            </a:extLst>
+          </a:blip>
+          <a:stretch>
+            <a:fillRect/>
+          </a:stretch>
+        </p:blipFill>
+        <p:spPr>
+          <a:xfrm>
+            <a:off x="2803786" y="1731963"/>
+            <a:ext cx="6574903" cy="4059237"/>
+          </a:xfrm>
+        </p:spPr>
+      </p:pic>
+    </p:spTree>
+    <p:extLst>
+      <p:ext uri="{BB962C8B-B14F-4D97-AF65-F5344CB8AC3E}">
+        <p14:creationId xmlns:p14="http://schemas.microsoft.com/office/powerpoint/2010/main" val="1765407822"/>
+      </p:ext>
+    </p:extLst>
+  </p:cSld>
+  <p:clrMapOvr>
+    <a:masterClrMapping/>
+  </p:clrMapOvr>
+</p:sld>
+</file>
+
+<file path=ppt/slides/slide9.xml><?xml version="1.0" encoding="utf-8"?>
+<p:sld xmlns:a="http://schemas.openxmlformats.org/drawingml/2006/main" xmlns:r="http://schemas.openxmlformats.org/officeDocument/2006/relationships" xmlns:p="http://schemas.openxmlformats.org/presentationml/2006/main">
+  <p:cSld>
+    <p:spTree>
+      <p:nvGrpSpPr>
+        <p:cNvPr id="1" name=""/>
+        <p:cNvGrpSpPr/>
+        <p:nvPr/>
+      </p:nvGrpSpPr>
+      <p:grpSpPr>
+        <a:xfrm>
+          <a:off x="0" y="0"/>
+          <a:ext cx="0" cy="0"/>
+          <a:chOff x="0" y="0"/>
+          <a:chExt cx="0" cy="0"/>
+        </a:xfrm>
+      </p:grpSpPr>
+      <p:sp>
+        <p:nvSpPr>
+          <p:cNvPr id="2" name="Title 1">
+            <a:extLst>
+              <a:ext uri="{FF2B5EF4-FFF2-40B4-BE49-F238E27FC236}">
+                <a16:creationId xmlns:a16="http://schemas.microsoft.com/office/drawing/2014/main" id="{D1B60822-64B8-477D-BD04-B7CFA687E207}"/>
+              </a:ext>
+            </a:extLst>
+          </p:cNvPr>
+          <p:cNvSpPr>
+            <a:spLocks noGrp="1"/>
+          </p:cNvSpPr>
+          <p:nvPr>
+            <p:ph type="title"/>
+          </p:nvPr>
+        </p:nvSpPr>
+        <p:spPr/>
+        <p:txBody>
+          <a:bodyPr/>
+          <a:lstStyle/>
+          <a:p>
+            <a:r>
+              <a:rPr lang="en-US"/>
+              <a:t>Gabung Excel</a:t>
+            </a:r>
+          </a:p>
+        </p:txBody>
+      </p:sp>
+      <p:pic>
+        <p:nvPicPr>
+          <p:cNvPr id="5" name="Content Placeholder 4">
+            <a:extLst>
+              <a:ext uri="{FF2B5EF4-FFF2-40B4-BE49-F238E27FC236}">
+                <a16:creationId xmlns:a16="http://schemas.microsoft.com/office/drawing/2014/main" id="{F2BA60AE-4C09-41D3-8606-2338BA501A57}"/>
+              </a:ext>
+            </a:extLst>
+          </p:cNvPr>
+          <p:cNvPicPr>
+            <a:picLocks noGrp="1" noChangeAspect="1"/>
+          </p:cNvPicPr>
+          <p:nvPr>
+            <p:ph idx="1"/>
+          </p:nvPr>
+        </p:nvPicPr>
+        <p:blipFill>
+          <a:blip r:embed="rId2">
+            <a:extLst>
+              <a:ext uri="{28A0092B-C50C-407E-A947-70E740481C1C}">
+                <a14:useLocalDpi xmlns:a14="http://schemas.microsoft.com/office/drawing/2010/main" val="0"/>
+              </a:ext>
+            </a:extLst>
+          </a:blip>
+          <a:stretch>
+            <a:fillRect/>
+          </a:stretch>
+        </p:blipFill>
+        <p:spPr>
+          <a:xfrm>
+            <a:off x="2803786" y="1731963"/>
+            <a:ext cx="6574903" cy="4059237"/>
+          </a:xfrm>
+        </p:spPr>
+      </p:pic>
+    </p:spTree>
+    <p:extLst>
+      <p:ext uri="{BB962C8B-B14F-4D97-AF65-F5344CB8AC3E}">
+        <p14:creationId xmlns:p14="http://schemas.microsoft.com/office/powerpoint/2010/main" val="572068707"/>
+      </p:ext>
+    </p:extLst>
+  </p:cSld>
+  <p:clrMapOvr>
+    <a:masterClrMapping/>
+  </p:clrMapOvr>
+</p:sld>
+</file>
+
 <file path=ppt/theme/theme1.xml><?xml version="1.0" encoding="utf-8"?>
 <a:theme xmlns:a="http://schemas.openxmlformats.org/drawingml/2006/main" name="Slate">
   <a:themeElements>

</xml_diff>